<commit_message>
Updated dcm theory image
</commit_message>
<xml_diff>
--- a/theory/dcm/theory-dcm-images.pptx
+++ b/theory/dcm/theory-dcm-images.pptx
@@ -104,6 +104,11 @@
       </a:defRPr>
     </a:lvl9pPr>
   </p:defaultTextStyle>
+  <p:extLst>
+    <p:ext uri="{EFAFB233-063F-42B5-8137-9DF3F51BA10A}">
+      <p15:sldGuideLst xmlns:p15="http://schemas.microsoft.com/office/powerpoint/2012/main"/>
+    </p:ext>
+  </p:extLst>
 </p:presentation>
 </file>
 
@@ -2972,10 +2977,10 @@
         </p:nvGrpSpPr>
         <p:grpSpPr>
           <a:xfrm>
-            <a:off x="2858759" y="2402467"/>
-            <a:ext cx="5930230" cy="1183157"/>
-            <a:chOff x="2858759" y="2402467"/>
-            <a:chExt cx="5930230" cy="1183157"/>
+            <a:off x="2778304" y="2626063"/>
+            <a:ext cx="4668700" cy="894258"/>
+            <a:chOff x="2754772" y="2710250"/>
+            <a:chExt cx="6034217" cy="1230956"/>
           </a:xfrm>
         </p:grpSpPr>
         <p:sp>
@@ -3021,10 +3026,10 @@
             <a:p>
               <a:pPr algn="ctr"/>
               <a:r>
-                <a:rPr lang="en-GB" sz="1600" dirty="0" smtClean="0"/>
+                <a:rPr lang="en-GB" sz="1200" b="1" dirty="0" smtClean="0"/>
                 <a:t>Stimuli</a:t>
               </a:r>
-              <a:endParaRPr lang="en-GB" sz="1600" dirty="0"/>
+              <a:endParaRPr lang="en-GB" sz="1200" b="1" dirty="0"/>
             </a:p>
           </p:txBody>
         </p:sp>
@@ -3071,10 +3076,10 @@
             <a:p>
               <a:pPr algn="ctr"/>
               <a:r>
-                <a:rPr lang="en-GB" sz="1600" dirty="0" smtClean="0"/>
+                <a:rPr lang="en-GB" sz="1200" b="1" dirty="0" smtClean="0"/>
                 <a:t>Neural activity</a:t>
               </a:r>
-              <a:endParaRPr lang="en-GB" sz="1600" dirty="0"/>
+              <a:endParaRPr lang="en-GB" sz="1200" b="1" dirty="0"/>
             </a:p>
           </p:txBody>
         </p:sp>
@@ -3121,14 +3126,14 @@
             <a:p>
               <a:pPr algn="ctr"/>
               <a:r>
-                <a:rPr lang="en-GB" sz="1600" dirty="0" smtClean="0">
+                <a:rPr lang="en-GB" sz="1200" b="1" dirty="0" smtClean="0">
                   <a:solidFill>
                     <a:schemeClr val="bg1"/>
                   </a:solidFill>
                 </a:rPr>
                 <a:t>Measurements</a:t>
               </a:r>
-              <a:endParaRPr lang="en-GB" sz="1600" dirty="0">
+              <a:endParaRPr lang="en-GB" sz="1200" b="1" dirty="0">
                 <a:solidFill>
                   <a:schemeClr val="bg1"/>
                 </a:solidFill>
@@ -3222,8 +3227,8 @@
           </p:nvSpPr>
           <p:spPr>
             <a:xfrm>
-              <a:off x="2858759" y="2402467"/>
-              <a:ext cx="1709122" cy="261610"/>
+              <a:off x="2754772" y="3643491"/>
+              <a:ext cx="1923112" cy="297715"/>
             </a:xfrm>
             <a:prstGeom prst="rect">
               <a:avLst/>
@@ -3237,7 +3242,7 @@
             <a:lstStyle/>
             <a:p>
               <a:r>
-                <a:rPr lang="en-GB" sz="1100" i="1" dirty="0" smtClean="0">
+                <a:rPr lang="en-GB" sz="1050" i="1" dirty="0" smtClean="0">
                   <a:solidFill>
                     <a:schemeClr val="tx1">
                       <a:lumMod val="50000"/>
@@ -3247,7 +3252,7 @@
                 </a:rPr>
                 <a:t>(no stimuli in resting state)</a:t>
               </a:r>
-              <a:endParaRPr lang="en-GB" sz="1100" i="1" dirty="0">
+              <a:endParaRPr lang="en-GB" sz="1050" i="1" dirty="0">
                 <a:solidFill>
                   <a:schemeClr val="tx1">
                     <a:lumMod val="50000"/>
@@ -3258,8 +3263,8 @@
             </a:p>
           </p:txBody>
         </p:sp>
-        <mc:AlternateContent xmlns:mc="http://schemas.openxmlformats.org/markup-compatibility/2006">
-          <mc:Choice xmlns:a14="http://schemas.microsoft.com/office/drawing/2010/main" Requires="a14">
+        <mc:AlternateContent xmlns:mc="http://schemas.openxmlformats.org/markup-compatibility/2006" xmlns:a14="http://schemas.microsoft.com/office/drawing/2010/main">
+          <mc:Choice Requires="a14">
             <p:sp>
               <p:nvSpPr>
                 <p:cNvPr id="18" name="TextBox 17"/>
@@ -3269,7 +3274,7 @@
               <p:spPr>
                 <a:xfrm>
                   <a:off x="3617428" y="3308625"/>
-                  <a:ext cx="191784" cy="276999"/>
+                  <a:ext cx="197800" cy="288692"/>
                 </a:xfrm>
                 <a:prstGeom prst="rect">
                   <a:avLst/>
@@ -3282,6 +3287,7 @@
                 </a:bodyPr>
                 <a:lstStyle/>
                 <a:p>
+                  <a:pPr/>
                   <a14:m>
                     <m:oMathPara xmlns:m="http://schemas.openxmlformats.org/officeDocument/2006/math">
                       <m:oMathParaPr>
@@ -3289,7 +3295,7 @@
                       </m:oMathParaPr>
                       <m:oMath xmlns:m="http://schemas.openxmlformats.org/officeDocument/2006/math">
                         <m:r>
-                          <a:rPr lang="en-GB" b="0" i="1" smtClean="0">
+                          <a:rPr lang="en-GB" sz="1600" b="0" i="1" smtClean="0">
                             <a:latin typeface="Cambria Math" panose="02040503050406030204" pitchFamily="18" charset="0"/>
                           </a:rPr>
                           <m:t>𝑢</m:t>
@@ -3297,12 +3303,12 @@
                       </m:oMath>
                     </m:oMathPara>
                   </a14:m>
-                  <a:endParaRPr lang="en-GB" dirty="0"/>
+                  <a:endParaRPr lang="en-GB" sz="1600" dirty="0"/>
                 </a:p>
               </p:txBody>
             </p:sp>
           </mc:Choice>
-          <mc:Fallback>
+          <mc:Fallback xmlns="">
             <p:sp>
               <p:nvSpPr>
                 <p:cNvPr id="18" name="TextBox 17"/>
@@ -3341,8 +3347,8 @@
             </p:sp>
           </mc:Fallback>
         </mc:AlternateContent>
-        <mc:AlternateContent xmlns:mc="http://schemas.openxmlformats.org/markup-compatibility/2006">
-          <mc:Choice xmlns:a14="http://schemas.microsoft.com/office/drawing/2010/main" Requires="a14">
+        <mc:AlternateContent xmlns:mc="http://schemas.openxmlformats.org/markup-compatibility/2006" xmlns:a14="http://schemas.microsoft.com/office/drawing/2010/main">
+          <mc:Choice Requires="a14">
             <p:sp>
               <p:nvSpPr>
                 <p:cNvPr id="19" name="TextBox 18"/>
@@ -3352,7 +3358,7 @@
               <p:spPr>
                 <a:xfrm>
                   <a:off x="5757089" y="3308625"/>
-                  <a:ext cx="183319" cy="276999"/>
+                  <a:ext cx="189605" cy="288692"/>
                 </a:xfrm>
                 <a:prstGeom prst="rect">
                   <a:avLst/>
@@ -3365,6 +3371,7 @@
                 </a:bodyPr>
                 <a:lstStyle/>
                 <a:p>
+                  <a:pPr/>
                   <a14:m>
                     <m:oMathPara xmlns:m="http://schemas.openxmlformats.org/officeDocument/2006/math">
                       <m:oMathParaPr>
@@ -3372,7 +3379,7 @@
                       </m:oMathParaPr>
                       <m:oMath xmlns:m="http://schemas.openxmlformats.org/officeDocument/2006/math">
                         <m:r>
-                          <a:rPr lang="en-GB" b="0" i="1" smtClean="0">
+                          <a:rPr lang="en-GB" sz="1600" b="0" i="1" smtClean="0">
                             <a:latin typeface="Cambria Math" panose="02040503050406030204" pitchFamily="18" charset="0"/>
                           </a:rPr>
                           <m:t>𝑥</m:t>
@@ -3380,12 +3387,12 @@
                       </m:oMath>
                     </m:oMathPara>
                   </a14:m>
-                  <a:endParaRPr lang="en-GB" dirty="0"/>
+                  <a:endParaRPr lang="en-GB" sz="1600" dirty="0"/>
                 </a:p>
               </p:txBody>
             </p:sp>
           </mc:Choice>
-          <mc:Fallback>
+          <mc:Fallback xmlns="">
             <p:sp>
               <p:nvSpPr>
                 <p:cNvPr id="19" name="TextBox 18"/>
@@ -3424,8 +3431,8 @@
             </p:sp>
           </mc:Fallback>
         </mc:AlternateContent>
-        <mc:AlternateContent xmlns:mc="http://schemas.openxmlformats.org/markup-compatibility/2006">
-          <mc:Choice xmlns:a14="http://schemas.microsoft.com/office/drawing/2010/main" Requires="a14">
+        <mc:AlternateContent xmlns:mc="http://schemas.openxmlformats.org/markup-compatibility/2006" xmlns:a14="http://schemas.microsoft.com/office/drawing/2010/main">
+          <mc:Choice Requires="a14">
             <p:sp>
               <p:nvSpPr>
                 <p:cNvPr id="20" name="TextBox 19"/>
@@ -3435,7 +3442,7 @@
               <p:spPr>
                 <a:xfrm>
                   <a:off x="7894529" y="3308625"/>
-                  <a:ext cx="186718" cy="276999"/>
+                  <a:ext cx="193965" cy="288692"/>
                 </a:xfrm>
                 <a:prstGeom prst="rect">
                   <a:avLst/>
@@ -3448,6 +3455,7 @@
                 </a:bodyPr>
                 <a:lstStyle/>
                 <a:p>
+                  <a:pPr/>
                   <a14:m>
                     <m:oMathPara xmlns:m="http://schemas.openxmlformats.org/officeDocument/2006/math">
                       <m:oMathParaPr>
@@ -3455,7 +3463,7 @@
                       </m:oMathParaPr>
                       <m:oMath xmlns:m="http://schemas.openxmlformats.org/officeDocument/2006/math">
                         <m:r>
-                          <a:rPr lang="en-GB" b="0" i="1" smtClean="0">
+                          <a:rPr lang="en-GB" sz="1600" b="0" i="1" smtClean="0">
                             <a:latin typeface="Cambria Math" panose="02040503050406030204" pitchFamily="18" charset="0"/>
                           </a:rPr>
                           <m:t>𝑦</m:t>
@@ -3463,12 +3471,12 @@
                       </m:oMath>
                     </m:oMathPara>
                   </a14:m>
-                  <a:endParaRPr lang="en-GB" dirty="0"/>
+                  <a:endParaRPr lang="en-GB" sz="1600" dirty="0"/>
                 </a:p>
               </p:txBody>
             </p:sp>
           </mc:Choice>
-          <mc:Fallback>
+          <mc:Fallback xmlns="">
             <p:sp>
               <p:nvSpPr>
                 <p:cNvPr id="20" name="TextBox 19"/>

</xml_diff>

<commit_message>
Added graphic for forward and inverse problems
</commit_message>
<xml_diff>
--- a/theory/dcm/theory-dcm-images.pptx
+++ b/theory/dcm/theory-dcm-images.pptx
@@ -2977,7 +2977,7 @@
         </p:nvGrpSpPr>
         <p:grpSpPr>
           <a:xfrm>
-            <a:off x="2778304" y="2626063"/>
+            <a:off x="4030455" y="747836"/>
             <a:ext cx="4026150" cy="815500"/>
             <a:chOff x="2754768" y="2710248"/>
             <a:chExt cx="6034211" cy="1301695"/>
@@ -3263,8 +3263,8 @@
             </a:p>
           </p:txBody>
         </p:sp>
-        <mc:AlternateContent xmlns:mc="http://schemas.openxmlformats.org/markup-compatibility/2006">
-          <mc:Choice xmlns:a14="http://schemas.microsoft.com/office/drawing/2010/main" Requires="a14">
+        <mc:AlternateContent xmlns:mc="http://schemas.openxmlformats.org/markup-compatibility/2006" xmlns:a14="http://schemas.microsoft.com/office/drawing/2010/main">
+          <mc:Choice Requires="a14">
             <p:sp>
               <p:nvSpPr>
                 <p:cNvPr id="18" name="TextBox 17"/>
@@ -3308,7 +3308,7 @@
               </p:txBody>
             </p:sp>
           </mc:Choice>
-          <mc:Fallback>
+          <mc:Fallback xmlns="">
             <p:sp>
               <p:nvSpPr>
                 <p:cNvPr id="18" name="TextBox 17"/>
@@ -3347,8 +3347,8 @@
             </p:sp>
           </mc:Fallback>
         </mc:AlternateContent>
-        <mc:AlternateContent xmlns:mc="http://schemas.openxmlformats.org/markup-compatibility/2006">
-          <mc:Choice xmlns:a14="http://schemas.microsoft.com/office/drawing/2010/main" Requires="a14">
+        <mc:AlternateContent xmlns:mc="http://schemas.openxmlformats.org/markup-compatibility/2006" xmlns:a14="http://schemas.microsoft.com/office/drawing/2010/main">
+          <mc:Choice Requires="a14">
             <p:sp>
               <p:nvSpPr>
                 <p:cNvPr id="19" name="TextBox 18"/>
@@ -3392,7 +3392,7 @@
               </p:txBody>
             </p:sp>
           </mc:Choice>
-          <mc:Fallback>
+          <mc:Fallback xmlns="">
             <p:sp>
               <p:nvSpPr>
                 <p:cNvPr id="19" name="TextBox 18"/>
@@ -3431,8 +3431,8 @@
             </p:sp>
           </mc:Fallback>
         </mc:AlternateContent>
-        <mc:AlternateContent xmlns:mc="http://schemas.openxmlformats.org/markup-compatibility/2006">
-          <mc:Choice xmlns:a14="http://schemas.microsoft.com/office/drawing/2010/main" Requires="a14">
+        <mc:AlternateContent xmlns:mc="http://schemas.openxmlformats.org/markup-compatibility/2006" xmlns:a14="http://schemas.microsoft.com/office/drawing/2010/main">
+          <mc:Choice Requires="a14">
             <p:sp>
               <p:nvSpPr>
                 <p:cNvPr id="20" name="TextBox 19"/>
@@ -3476,7 +3476,7 @@
               </p:txBody>
             </p:sp>
           </mc:Choice>
-          <mc:Fallback>
+          <mc:Fallback xmlns="">
             <p:sp>
               <p:nvSpPr>
                 <p:cNvPr id="20" name="TextBox 19"/>
@@ -3515,6 +3515,1241 @@
             </p:sp>
           </mc:Fallback>
         </mc:AlternateContent>
+      </p:grpSp>
+      <p:grpSp>
+        <p:nvGrpSpPr>
+          <p:cNvPr id="60" name="Group 59"/>
+          <p:cNvGrpSpPr/>
+          <p:nvPr/>
+        </p:nvGrpSpPr>
+        <p:grpSpPr>
+          <a:xfrm>
+            <a:off x="4138159" y="2037868"/>
+            <a:ext cx="3756161" cy="2738142"/>
+            <a:chOff x="4138159" y="2037868"/>
+            <a:chExt cx="3756161" cy="2738142"/>
+          </a:xfrm>
+        </p:grpSpPr>
+        <mc:AlternateContent xmlns:mc="http://schemas.openxmlformats.org/markup-compatibility/2006">
+          <mc:Choice xmlns:a14="http://schemas.microsoft.com/office/drawing/2010/main" Requires="a14">
+            <p:sp>
+              <p:nvSpPr>
+                <p:cNvPr id="51" name="TextBox 50"/>
+                <p:cNvSpPr txBox="1"/>
+                <p:nvPr/>
+              </p:nvSpPr>
+              <p:spPr>
+                <a:xfrm>
+                  <a:off x="5181517" y="4052735"/>
+                  <a:ext cx="1736467" cy="723275"/>
+                </a:xfrm>
+                <a:prstGeom prst="rect">
+                  <a:avLst/>
+                </a:prstGeom>
+                <a:solidFill>
+                  <a:schemeClr val="bg1">
+                    <a:lumMod val="95000"/>
+                  </a:schemeClr>
+                </a:solidFill>
+              </p:spPr>
+              <p:txBody>
+                <a:bodyPr wrap="square" rtlCol="0">
+                  <a:spAutoFit/>
+                </a:bodyPr>
+                <a:lstStyle/>
+                <a:p>
+                  <a:pPr algn="ctr"/>
+                  <a:endParaRPr lang="en-GB" sz="1100" dirty="0" smtClean="0"/>
+                </a:p>
+                <a:p>
+                  <a:pPr algn="ctr"/>
+                  <a:r>
+                    <a:rPr lang="en-GB" sz="1000" dirty="0" smtClean="0"/>
+                    <a:t>Given some signals, what settings of parameters </a:t>
+                  </a:r>
+                  <a14:m>
+                    <m:oMath xmlns:m="http://schemas.openxmlformats.org/officeDocument/2006/math">
+                      <m:r>
+                        <a:rPr lang="en-GB" sz="1000" b="0" i="1" smtClean="0">
+                          <a:latin typeface="Cambria Math" panose="02040503050406030204" pitchFamily="18" charset="0"/>
+                        </a:rPr>
+                        <m:t>𝜃</m:t>
+                      </m:r>
+                    </m:oMath>
+                  </a14:m>
+                  <a:r>
+                    <a:rPr lang="en-GB" sz="1000" dirty="0" smtClean="0"/>
+                    <a:t> would we expect?</a:t>
+                  </a:r>
+                  <a:endParaRPr lang="en-GB" sz="1000" dirty="0"/>
+                </a:p>
+              </p:txBody>
+            </p:sp>
+          </mc:Choice>
+          <mc:Fallback>
+            <p:sp>
+              <p:nvSpPr>
+                <p:cNvPr id="51" name="TextBox 50"/>
+                <p:cNvSpPr txBox="1">
+                  <a:spLocks noRot="1" noChangeAspect="1" noMove="1" noResize="1" noEditPoints="1" noAdjustHandles="1" noChangeArrowheads="1" noChangeShapeType="1" noTextEdit="1"/>
+                </p:cNvSpPr>
+                <p:nvPr/>
+              </p:nvSpPr>
+              <p:spPr>
+                <a:xfrm>
+                  <a:off x="5181517" y="4052735"/>
+                  <a:ext cx="1736467" cy="723275"/>
+                </a:xfrm>
+                <a:prstGeom prst="rect">
+                  <a:avLst/>
+                </a:prstGeom>
+                <a:blipFill rotWithShape="0">
+                  <a:blip r:embed="rId5"/>
+                  <a:stretch>
+                    <a:fillRect b="-4237"/>
+                  </a:stretch>
+                </a:blipFill>
+              </p:spPr>
+              <p:txBody>
+                <a:bodyPr/>
+                <a:lstStyle/>
+                <a:p>
+                  <a:r>
+                    <a:rPr lang="en-GB">
+                      <a:noFill/>
+                    </a:rPr>
+                    <a:t> </a:t>
+                  </a:r>
+                </a:p>
+              </p:txBody>
+            </p:sp>
+          </mc:Fallback>
+        </mc:AlternateContent>
+        <mc:AlternateContent xmlns:mc="http://schemas.openxmlformats.org/markup-compatibility/2006">
+          <mc:Choice xmlns:a14="http://schemas.microsoft.com/office/drawing/2010/main" Requires="a14">
+            <p:sp>
+              <p:nvSpPr>
+                <p:cNvPr id="10" name="TextBox 9"/>
+                <p:cNvSpPr txBox="1"/>
+                <p:nvPr/>
+              </p:nvSpPr>
+              <p:spPr>
+                <a:xfrm>
+                  <a:off x="5181517" y="2053730"/>
+                  <a:ext cx="1736467" cy="707886"/>
+                </a:xfrm>
+                <a:prstGeom prst="rect">
+                  <a:avLst/>
+                </a:prstGeom>
+                <a:solidFill>
+                  <a:schemeClr val="bg1">
+                    <a:lumMod val="95000"/>
+                  </a:schemeClr>
+                </a:solidFill>
+              </p:spPr>
+              <p:txBody>
+                <a:bodyPr wrap="square" rtlCol="0">
+                  <a:spAutoFit/>
+                </a:bodyPr>
+                <a:lstStyle/>
+                <a:p>
+                  <a:pPr algn="ctr"/>
+                  <a:endParaRPr lang="en-GB" sz="1000" dirty="0" smtClean="0"/>
+                </a:p>
+                <a:p>
+                  <a:pPr algn="ctr"/>
+                  <a:r>
+                    <a:rPr lang="en-GB" sz="1000" dirty="0" smtClean="0"/>
+                    <a:t>Given a brain model with parameters </a:t>
+                  </a:r>
+                  <a14:m>
+                    <m:oMath xmlns:m="http://schemas.openxmlformats.org/officeDocument/2006/math">
+                      <m:r>
+                        <a:rPr lang="en-GB" sz="1000" b="0" i="1" smtClean="0">
+                          <a:latin typeface="Cambria Math" panose="02040503050406030204" pitchFamily="18" charset="0"/>
+                        </a:rPr>
+                        <m:t>𝜃</m:t>
+                      </m:r>
+                    </m:oMath>
+                  </a14:m>
+                  <a:r>
+                    <a:rPr lang="en-GB" sz="1000" dirty="0" smtClean="0"/>
+                    <a:t>, what signals would we expect to observe?</a:t>
+                  </a:r>
+                  <a:endParaRPr lang="en-GB" sz="1000" dirty="0"/>
+                </a:p>
+              </p:txBody>
+            </p:sp>
+          </mc:Choice>
+          <mc:Fallback>
+            <p:sp>
+              <p:nvSpPr>
+                <p:cNvPr id="10" name="TextBox 9"/>
+                <p:cNvSpPr txBox="1">
+                  <a:spLocks noRot="1" noChangeAspect="1" noMove="1" noResize="1" noEditPoints="1" noAdjustHandles="1" noChangeArrowheads="1" noChangeShapeType="1" noTextEdit="1"/>
+                </p:cNvSpPr>
+                <p:nvPr/>
+              </p:nvSpPr>
+              <p:spPr>
+                <a:xfrm>
+                  <a:off x="5181517" y="2053730"/>
+                  <a:ext cx="1736467" cy="707886"/>
+                </a:xfrm>
+                <a:prstGeom prst="rect">
+                  <a:avLst/>
+                </a:prstGeom>
+                <a:blipFill rotWithShape="0">
+                  <a:blip r:embed="rId6"/>
+                  <a:stretch>
+                    <a:fillRect b="-4310"/>
+                  </a:stretch>
+                </a:blipFill>
+              </p:spPr>
+              <p:txBody>
+                <a:bodyPr/>
+                <a:lstStyle/>
+                <a:p>
+                  <a:r>
+                    <a:rPr lang="en-GB">
+                      <a:noFill/>
+                    </a:rPr>
+                    <a:t> </a:t>
+                  </a:r>
+                </a:p>
+              </p:txBody>
+            </p:sp>
+          </mc:Fallback>
+        </mc:AlternateContent>
+        <p:pic>
+          <p:nvPicPr>
+            <p:cNvPr id="2" name="Picture 1"/>
+            <p:cNvPicPr>
+              <a:picLocks noChangeAspect="1"/>
+            </p:cNvPicPr>
+            <p:nvPr/>
+          </p:nvPicPr>
+          <p:blipFill>
+            <a:blip r:embed="rId7" cstate="print">
+              <a:extLst>
+                <a:ext uri="{28A0092B-C50C-407E-A947-70E740481C1C}">
+                  <a14:useLocalDpi xmlns:a14="http://schemas.microsoft.com/office/drawing/2010/main" val="0"/>
+                </a:ext>
+              </a:extLst>
+            </a:blip>
+            <a:stretch>
+              <a:fillRect/>
+            </a:stretch>
+          </p:blipFill>
+          <p:spPr>
+            <a:xfrm flipH="1">
+              <a:off x="4138284" y="2839655"/>
+              <a:ext cx="1538669" cy="1129024"/>
+            </a:xfrm>
+            <a:prstGeom prst="rect">
+              <a:avLst/>
+            </a:prstGeom>
+          </p:spPr>
+        </p:pic>
+        <p:grpSp>
+          <p:nvGrpSpPr>
+            <p:cNvPr id="15" name="Group 14"/>
+            <p:cNvGrpSpPr>
+              <a:grpSpLocks/>
+            </p:cNvGrpSpPr>
+            <p:nvPr/>
+          </p:nvGrpSpPr>
+          <p:grpSpPr bwMode="auto">
+            <a:xfrm>
+              <a:off x="6641896" y="2848669"/>
+              <a:ext cx="1252424" cy="1129024"/>
+              <a:chOff x="3727" y="1824"/>
+              <a:chExt cx="1361" cy="1225"/>
+            </a:xfrm>
+          </p:grpSpPr>
+          <p:pic>
+            <p:nvPicPr>
+              <p:cNvPr id="22" name="Picture 21" descr="tete_EEG"/>
+              <p:cNvPicPr>
+                <a:picLocks noChangeAspect="1" noChangeArrowheads="1"/>
+              </p:cNvPicPr>
+              <p:nvPr/>
+            </p:nvPicPr>
+            <p:blipFill>
+              <a:blip r:embed="rId8">
+                <a:clrChange>
+                  <a:clrFrom>
+                    <a:srgbClr val="FBF9E7"/>
+                  </a:clrFrom>
+                  <a:clrTo>
+                    <a:srgbClr val="FBF9E7">
+                      <a:alpha val="0"/>
+                    </a:srgbClr>
+                  </a:clrTo>
+                </a:clrChange>
+                <a:duotone>
+                  <a:schemeClr val="accent6">
+                    <a:shade val="45000"/>
+                    <a:satMod val="135000"/>
+                  </a:schemeClr>
+                  <a:prstClr val="white"/>
+                </a:duotone>
+                <a:extLst>
+                  <a:ext uri="{28A0092B-C50C-407E-A947-70E740481C1C}">
+                    <a14:useLocalDpi xmlns:a14="http://schemas.microsoft.com/office/drawing/2010/main" val="0"/>
+                  </a:ext>
+                </a:extLst>
+              </a:blip>
+              <a:srcRect/>
+              <a:stretch>
+                <a:fillRect/>
+              </a:stretch>
+            </p:blipFill>
+            <p:spPr bwMode="auto">
+              <a:xfrm>
+                <a:off x="3727" y="1870"/>
+                <a:ext cx="1243" cy="1179"/>
+              </a:xfrm>
+              <a:prstGeom prst="rect">
+                <a:avLst/>
+              </a:prstGeom>
+              <a:noFill/>
+              <a:ln>
+                <a:noFill/>
+              </a:ln>
+              <a:extLst>
+                <a:ext uri="{909E8E84-426E-40DD-AFC4-6F175D3DCCD1}">
+                  <a14:hiddenFill xmlns:a14="http://schemas.microsoft.com/office/drawing/2010/main">
+                    <a:solidFill>
+                      <a:srgbClr val="FFFFFF"/>
+                    </a:solidFill>
+                  </a14:hiddenFill>
+                </a:ext>
+                <a:ext uri="{91240B29-F687-4F45-9708-019B960494DF}">
+                  <a14:hiddenLine xmlns:a14="http://schemas.microsoft.com/office/drawing/2010/main" w="9525">
+                    <a:solidFill>
+                      <a:srgbClr val="000000"/>
+                    </a:solidFill>
+                    <a:miter lim="800000"/>
+                    <a:headEnd/>
+                    <a:tailEnd/>
+                  </a14:hiddenLine>
+                </a:ext>
+              </a:extLst>
+            </p:spPr>
+          </p:pic>
+          <p:sp>
+            <p:nvSpPr>
+              <p:cNvPr id="23" name="Freeform 22"/>
+              <p:cNvSpPr>
+                <a:spLocks/>
+              </p:cNvSpPr>
+              <p:nvPr/>
+            </p:nvSpPr>
+            <p:spPr bwMode="auto">
+              <a:xfrm>
+                <a:off x="4450" y="1824"/>
+                <a:ext cx="638" cy="1011"/>
+              </a:xfrm>
+              <a:custGeom>
+                <a:avLst/>
+                <a:gdLst>
+                  <a:gd name="T0" fmla="*/ 0 w 2268"/>
+                  <a:gd name="T1" fmla="*/ 1 h 2562"/>
+                  <a:gd name="T2" fmla="*/ 0 w 2268"/>
+                  <a:gd name="T3" fmla="*/ 1 h 2562"/>
+                  <a:gd name="T4" fmla="*/ 0 w 2268"/>
+                  <a:gd name="T5" fmla="*/ 1 h 2562"/>
+                  <a:gd name="T6" fmla="*/ 0 w 2268"/>
+                  <a:gd name="T7" fmla="*/ 1 h 2562"/>
+                  <a:gd name="T8" fmla="*/ 0 w 2268"/>
+                  <a:gd name="T9" fmla="*/ 0 h 2562"/>
+                  <a:gd name="T10" fmla="*/ 0 w 2268"/>
+                  <a:gd name="T11" fmla="*/ 1 h 2562"/>
+                  <a:gd name="T12" fmla="*/ 0 w 2268"/>
+                  <a:gd name="T13" fmla="*/ 1 h 2562"/>
+                  <a:gd name="T14" fmla="*/ 0 w 2268"/>
+                  <a:gd name="T15" fmla="*/ 1 h 2562"/>
+                  <a:gd name="T16" fmla="*/ 0 w 2268"/>
+                  <a:gd name="T17" fmla="*/ 1 h 2562"/>
+                  <a:gd name="T18" fmla="*/ 0 w 2268"/>
+                  <a:gd name="T19" fmla="*/ 1 h 2562"/>
+                  <a:gd name="T20" fmla="*/ 0 w 2268"/>
+                  <a:gd name="T21" fmla="*/ 1 h 2562"/>
+                  <a:gd name="T22" fmla="*/ 0 w 2268"/>
+                  <a:gd name="T23" fmla="*/ 1 h 2562"/>
+                  <a:gd name="T24" fmla="*/ 0 w 2268"/>
+                  <a:gd name="T25" fmla="*/ 0 h 2562"/>
+                  <a:gd name="T26" fmla="*/ 0 w 2268"/>
+                  <a:gd name="T27" fmla="*/ 2 h 2562"/>
+                  <a:gd name="T28" fmla="*/ 0 w 2268"/>
+                  <a:gd name="T29" fmla="*/ 1 h 2562"/>
+                  <a:gd name="T30" fmla="*/ 0 w 2268"/>
+                  <a:gd name="T31" fmla="*/ 1 h 2562"/>
+                  <a:gd name="T32" fmla="*/ 0 w 2268"/>
+                  <a:gd name="T33" fmla="*/ 0 h 2562"/>
+                  <a:gd name="T34" fmla="*/ 0 w 2268"/>
+                  <a:gd name="T35" fmla="*/ 1 h 2562"/>
+                  <a:gd name="T36" fmla="*/ 0 w 2268"/>
+                  <a:gd name="T37" fmla="*/ 1 h 2562"/>
+                  <a:gd name="T38" fmla="*/ 0 w 2268"/>
+                  <a:gd name="T39" fmla="*/ 1 h 2562"/>
+                  <a:gd name="T40" fmla="*/ 0 w 2268"/>
+                  <a:gd name="T41" fmla="*/ 1 h 2562"/>
+                  <a:gd name="T42" fmla="*/ 0 w 2268"/>
+                  <a:gd name="T43" fmla="*/ 1 h 2562"/>
+                  <a:gd name="T44" fmla="*/ 0 w 2268"/>
+                  <a:gd name="T45" fmla="*/ 1 h 2562"/>
+                  <a:gd name="T46" fmla="*/ 0 60000 65536"/>
+                  <a:gd name="T47" fmla="*/ 0 60000 65536"/>
+                  <a:gd name="T48" fmla="*/ 0 60000 65536"/>
+                  <a:gd name="T49" fmla="*/ 0 60000 65536"/>
+                  <a:gd name="T50" fmla="*/ 0 60000 65536"/>
+                  <a:gd name="T51" fmla="*/ 0 60000 65536"/>
+                  <a:gd name="T52" fmla="*/ 0 60000 65536"/>
+                  <a:gd name="T53" fmla="*/ 0 60000 65536"/>
+                  <a:gd name="T54" fmla="*/ 0 60000 65536"/>
+                  <a:gd name="T55" fmla="*/ 0 60000 65536"/>
+                  <a:gd name="T56" fmla="*/ 0 60000 65536"/>
+                  <a:gd name="T57" fmla="*/ 0 60000 65536"/>
+                  <a:gd name="T58" fmla="*/ 0 60000 65536"/>
+                  <a:gd name="T59" fmla="*/ 0 60000 65536"/>
+                  <a:gd name="T60" fmla="*/ 0 60000 65536"/>
+                  <a:gd name="T61" fmla="*/ 0 60000 65536"/>
+                  <a:gd name="T62" fmla="*/ 0 60000 65536"/>
+                  <a:gd name="T63" fmla="*/ 0 60000 65536"/>
+                  <a:gd name="T64" fmla="*/ 0 60000 65536"/>
+                  <a:gd name="T65" fmla="*/ 0 60000 65536"/>
+                  <a:gd name="T66" fmla="*/ 0 60000 65536"/>
+                  <a:gd name="T67" fmla="*/ 0 60000 65536"/>
+                  <a:gd name="T68" fmla="*/ 0 60000 65536"/>
+                  <a:gd name="T69" fmla="*/ 0 w 2268"/>
+                  <a:gd name="T70" fmla="*/ 0 h 2562"/>
+                  <a:gd name="T71" fmla="*/ 2268 w 2268"/>
+                  <a:gd name="T72" fmla="*/ 2562 h 2562"/>
+                </a:gdLst>
+                <a:ahLst/>
+                <a:cxnLst>
+                  <a:cxn ang="T46">
+                    <a:pos x="T0" y="T1"/>
+                  </a:cxn>
+                  <a:cxn ang="T47">
+                    <a:pos x="T2" y="T3"/>
+                  </a:cxn>
+                  <a:cxn ang="T48">
+                    <a:pos x="T4" y="T5"/>
+                  </a:cxn>
+                  <a:cxn ang="T49">
+                    <a:pos x="T6" y="T7"/>
+                  </a:cxn>
+                  <a:cxn ang="T50">
+                    <a:pos x="T8" y="T9"/>
+                  </a:cxn>
+                  <a:cxn ang="T51">
+                    <a:pos x="T10" y="T11"/>
+                  </a:cxn>
+                  <a:cxn ang="T52">
+                    <a:pos x="T12" y="T13"/>
+                  </a:cxn>
+                  <a:cxn ang="T53">
+                    <a:pos x="T14" y="T15"/>
+                  </a:cxn>
+                  <a:cxn ang="T54">
+                    <a:pos x="T16" y="T17"/>
+                  </a:cxn>
+                  <a:cxn ang="T55">
+                    <a:pos x="T18" y="T19"/>
+                  </a:cxn>
+                  <a:cxn ang="T56">
+                    <a:pos x="T20" y="T21"/>
+                  </a:cxn>
+                  <a:cxn ang="T57">
+                    <a:pos x="T22" y="T23"/>
+                  </a:cxn>
+                  <a:cxn ang="T58">
+                    <a:pos x="T24" y="T25"/>
+                  </a:cxn>
+                  <a:cxn ang="T59">
+                    <a:pos x="T26" y="T27"/>
+                  </a:cxn>
+                  <a:cxn ang="T60">
+                    <a:pos x="T28" y="T29"/>
+                  </a:cxn>
+                  <a:cxn ang="T61">
+                    <a:pos x="T30" y="T31"/>
+                  </a:cxn>
+                  <a:cxn ang="T62">
+                    <a:pos x="T32" y="T33"/>
+                  </a:cxn>
+                  <a:cxn ang="T63">
+                    <a:pos x="T34" y="T35"/>
+                  </a:cxn>
+                  <a:cxn ang="T64">
+                    <a:pos x="T36" y="T37"/>
+                  </a:cxn>
+                  <a:cxn ang="T65">
+                    <a:pos x="T38" y="T39"/>
+                  </a:cxn>
+                  <a:cxn ang="T66">
+                    <a:pos x="T40" y="T41"/>
+                  </a:cxn>
+                  <a:cxn ang="T67">
+                    <a:pos x="T42" y="T43"/>
+                  </a:cxn>
+                  <a:cxn ang="T68">
+                    <a:pos x="T44" y="T45"/>
+                  </a:cxn>
+                </a:cxnLst>
+                <a:rect l="T69" t="T70" r="T71" b="T72"/>
+                <a:pathLst>
+                  <a:path w="2268" h="2562">
+                    <a:moveTo>
+                      <a:pt x="0" y="1254"/>
+                    </a:moveTo>
+                    <a:cubicBezTo>
+                      <a:pt x="91" y="1276"/>
+                      <a:pt x="182" y="1299"/>
+                      <a:pt x="227" y="1254"/>
+                    </a:cubicBezTo>
+                    <a:cubicBezTo>
+                      <a:pt x="272" y="1209"/>
+                      <a:pt x="249" y="937"/>
+                      <a:pt x="272" y="982"/>
+                    </a:cubicBezTo>
+                    <a:cubicBezTo>
+                      <a:pt x="295" y="1027"/>
+                      <a:pt x="340" y="1639"/>
+                      <a:pt x="363" y="1526"/>
+                    </a:cubicBezTo>
+                    <a:cubicBezTo>
+                      <a:pt x="386" y="1413"/>
+                      <a:pt x="393" y="332"/>
+                      <a:pt x="408" y="302"/>
+                    </a:cubicBezTo>
+                    <a:cubicBezTo>
+                      <a:pt x="423" y="272"/>
+                      <a:pt x="424" y="1232"/>
+                      <a:pt x="454" y="1345"/>
+                    </a:cubicBezTo>
+                    <a:cubicBezTo>
+                      <a:pt x="484" y="1458"/>
+                      <a:pt x="552" y="952"/>
+                      <a:pt x="590" y="982"/>
+                    </a:cubicBezTo>
+                    <a:cubicBezTo>
+                      <a:pt x="628" y="1012"/>
+                      <a:pt x="657" y="1541"/>
+                      <a:pt x="680" y="1526"/>
+                    </a:cubicBezTo>
+                    <a:cubicBezTo>
+                      <a:pt x="703" y="1511"/>
+                      <a:pt x="703" y="914"/>
+                      <a:pt x="726" y="891"/>
+                    </a:cubicBezTo>
+                    <a:cubicBezTo>
+                      <a:pt x="749" y="868"/>
+                      <a:pt x="779" y="1352"/>
+                      <a:pt x="817" y="1390"/>
+                    </a:cubicBezTo>
+                    <a:cubicBezTo>
+                      <a:pt x="855" y="1428"/>
+                      <a:pt x="915" y="1118"/>
+                      <a:pt x="953" y="1118"/>
+                    </a:cubicBezTo>
+                    <a:cubicBezTo>
+                      <a:pt x="991" y="1118"/>
+                      <a:pt x="990" y="1549"/>
+                      <a:pt x="1043" y="1390"/>
+                    </a:cubicBezTo>
+                    <a:cubicBezTo>
+                      <a:pt x="1096" y="1231"/>
+                      <a:pt x="1209" y="0"/>
+                      <a:pt x="1270" y="166"/>
+                    </a:cubicBezTo>
+                    <a:cubicBezTo>
+                      <a:pt x="1331" y="332"/>
+                      <a:pt x="1376" y="2214"/>
+                      <a:pt x="1406" y="2388"/>
+                    </a:cubicBezTo>
+                    <a:cubicBezTo>
+                      <a:pt x="1436" y="2562"/>
+                      <a:pt x="1429" y="1375"/>
+                      <a:pt x="1452" y="1209"/>
+                    </a:cubicBezTo>
+                    <a:cubicBezTo>
+                      <a:pt x="1475" y="1043"/>
+                      <a:pt x="1519" y="1458"/>
+                      <a:pt x="1542" y="1390"/>
+                    </a:cubicBezTo>
+                    <a:cubicBezTo>
+                      <a:pt x="1565" y="1322"/>
+                      <a:pt x="1558" y="763"/>
+                      <a:pt x="1588" y="801"/>
+                    </a:cubicBezTo>
+                    <a:cubicBezTo>
+                      <a:pt x="1618" y="839"/>
+                      <a:pt x="1694" y="1572"/>
+                      <a:pt x="1724" y="1617"/>
+                    </a:cubicBezTo>
+                    <a:cubicBezTo>
+                      <a:pt x="1754" y="1662"/>
+                      <a:pt x="1739" y="1126"/>
+                      <a:pt x="1769" y="1073"/>
+                    </a:cubicBezTo>
+                    <a:cubicBezTo>
+                      <a:pt x="1799" y="1020"/>
+                      <a:pt x="1867" y="1293"/>
+                      <a:pt x="1905" y="1300"/>
+                    </a:cubicBezTo>
+                    <a:cubicBezTo>
+                      <a:pt x="1943" y="1307"/>
+                      <a:pt x="1966" y="1118"/>
+                      <a:pt x="1996" y="1118"/>
+                    </a:cubicBezTo>
+                    <a:cubicBezTo>
+                      <a:pt x="2026" y="1118"/>
+                      <a:pt x="2042" y="1270"/>
+                      <a:pt x="2087" y="1300"/>
+                    </a:cubicBezTo>
+                    <a:cubicBezTo>
+                      <a:pt x="2132" y="1330"/>
+                      <a:pt x="2200" y="1315"/>
+                      <a:pt x="2268" y="1300"/>
+                    </a:cubicBezTo>
+                  </a:path>
+                </a:pathLst>
+              </a:custGeom>
+              <a:noFill/>
+              <a:ln w="9525" cmpd="sng">
+                <a:solidFill>
+                  <a:schemeClr val="tx1"/>
+                </a:solidFill>
+                <a:round/>
+                <a:headEnd/>
+                <a:tailEnd/>
+              </a:ln>
+              <a:extLst>
+                <a:ext uri="{909E8E84-426E-40DD-AFC4-6F175D3DCCD1}">
+                  <a14:hiddenFill xmlns:a14="http://schemas.microsoft.com/office/drawing/2010/main">
+                    <a:solidFill>
+                      <a:srgbClr val="FFFFFF"/>
+                    </a:solidFill>
+                  </a14:hiddenFill>
+                </a:ext>
+              </a:extLst>
+            </p:spPr>
+            <p:txBody>
+              <a:bodyPr/>
+              <a:lstStyle>
+                <a:defPPr>
+                  <a:defRPr lang="en-US"/>
+                </a:defPPr>
+                <a:lvl1pPr algn="ctr" rtl="0" eaLnBrk="0" fontAlgn="base" hangingPunct="0">
+                  <a:spcBef>
+                    <a:spcPct val="0"/>
+                  </a:spcBef>
+                  <a:spcAft>
+                    <a:spcPct val="0"/>
+                  </a:spcAft>
+                  <a:defRPr kern="1200">
+                    <a:solidFill>
+                      <a:schemeClr val="tx1"/>
+                    </a:solidFill>
+                    <a:latin typeface="Times" panose="02020603050405020304" pitchFamily="18" charset="0"/>
+                    <a:ea typeface="+mn-ea"/>
+                    <a:cs typeface="+mn-cs"/>
+                  </a:defRPr>
+                </a:lvl1pPr>
+                <a:lvl2pPr marL="457200" algn="ctr" rtl="0" eaLnBrk="0" fontAlgn="base" hangingPunct="0">
+                  <a:spcBef>
+                    <a:spcPct val="0"/>
+                  </a:spcBef>
+                  <a:spcAft>
+                    <a:spcPct val="0"/>
+                  </a:spcAft>
+                  <a:defRPr kern="1200">
+                    <a:solidFill>
+                      <a:schemeClr val="tx1"/>
+                    </a:solidFill>
+                    <a:latin typeface="Times" panose="02020603050405020304" pitchFamily="18" charset="0"/>
+                    <a:ea typeface="+mn-ea"/>
+                    <a:cs typeface="+mn-cs"/>
+                  </a:defRPr>
+                </a:lvl2pPr>
+                <a:lvl3pPr marL="914400" algn="ctr" rtl="0" eaLnBrk="0" fontAlgn="base" hangingPunct="0">
+                  <a:spcBef>
+                    <a:spcPct val="0"/>
+                  </a:spcBef>
+                  <a:spcAft>
+                    <a:spcPct val="0"/>
+                  </a:spcAft>
+                  <a:defRPr kern="1200">
+                    <a:solidFill>
+                      <a:schemeClr val="tx1"/>
+                    </a:solidFill>
+                    <a:latin typeface="Times" panose="02020603050405020304" pitchFamily="18" charset="0"/>
+                    <a:ea typeface="+mn-ea"/>
+                    <a:cs typeface="+mn-cs"/>
+                  </a:defRPr>
+                </a:lvl3pPr>
+                <a:lvl4pPr marL="1371600" algn="ctr" rtl="0" eaLnBrk="0" fontAlgn="base" hangingPunct="0">
+                  <a:spcBef>
+                    <a:spcPct val="0"/>
+                  </a:spcBef>
+                  <a:spcAft>
+                    <a:spcPct val="0"/>
+                  </a:spcAft>
+                  <a:defRPr kern="1200">
+                    <a:solidFill>
+                      <a:schemeClr val="tx1"/>
+                    </a:solidFill>
+                    <a:latin typeface="Times" panose="02020603050405020304" pitchFamily="18" charset="0"/>
+                    <a:ea typeface="+mn-ea"/>
+                    <a:cs typeface="+mn-cs"/>
+                  </a:defRPr>
+                </a:lvl4pPr>
+                <a:lvl5pPr marL="1828800" algn="ctr" rtl="0" eaLnBrk="0" fontAlgn="base" hangingPunct="0">
+                  <a:spcBef>
+                    <a:spcPct val="0"/>
+                  </a:spcBef>
+                  <a:spcAft>
+                    <a:spcPct val="0"/>
+                  </a:spcAft>
+                  <a:defRPr kern="1200">
+                    <a:solidFill>
+                      <a:schemeClr val="tx1"/>
+                    </a:solidFill>
+                    <a:latin typeface="Times" panose="02020603050405020304" pitchFamily="18" charset="0"/>
+                    <a:ea typeface="+mn-ea"/>
+                    <a:cs typeface="+mn-cs"/>
+                  </a:defRPr>
+                </a:lvl5pPr>
+                <a:lvl6pPr marL="2286000" algn="l" defTabSz="914400" rtl="0" eaLnBrk="1" latinLnBrk="0" hangingPunct="1">
+                  <a:defRPr kern="1200">
+                    <a:solidFill>
+                      <a:schemeClr val="tx1"/>
+                    </a:solidFill>
+                    <a:latin typeface="Times" panose="02020603050405020304" pitchFamily="18" charset="0"/>
+                    <a:ea typeface="+mn-ea"/>
+                    <a:cs typeface="+mn-cs"/>
+                  </a:defRPr>
+                </a:lvl6pPr>
+                <a:lvl7pPr marL="2743200" algn="l" defTabSz="914400" rtl="0" eaLnBrk="1" latinLnBrk="0" hangingPunct="1">
+                  <a:defRPr kern="1200">
+                    <a:solidFill>
+                      <a:schemeClr val="tx1"/>
+                    </a:solidFill>
+                    <a:latin typeface="Times" panose="02020603050405020304" pitchFamily="18" charset="0"/>
+                    <a:ea typeface="+mn-ea"/>
+                    <a:cs typeface="+mn-cs"/>
+                  </a:defRPr>
+                </a:lvl7pPr>
+                <a:lvl8pPr marL="3200400" algn="l" defTabSz="914400" rtl="0" eaLnBrk="1" latinLnBrk="0" hangingPunct="1">
+                  <a:defRPr kern="1200">
+                    <a:solidFill>
+                      <a:schemeClr val="tx1"/>
+                    </a:solidFill>
+                    <a:latin typeface="Times" panose="02020603050405020304" pitchFamily="18" charset="0"/>
+                    <a:ea typeface="+mn-ea"/>
+                    <a:cs typeface="+mn-cs"/>
+                  </a:defRPr>
+                </a:lvl8pPr>
+                <a:lvl9pPr marL="3657600" algn="l" defTabSz="914400" rtl="0" eaLnBrk="1" latinLnBrk="0" hangingPunct="1">
+                  <a:defRPr kern="1200">
+                    <a:solidFill>
+                      <a:schemeClr val="tx1"/>
+                    </a:solidFill>
+                    <a:latin typeface="Times" panose="02020603050405020304" pitchFamily="18" charset="0"/>
+                    <a:ea typeface="+mn-ea"/>
+                    <a:cs typeface="+mn-cs"/>
+                  </a:defRPr>
+                </a:lvl9pPr>
+              </a:lstStyle>
+              <a:p>
+                <a:endParaRPr lang="en-GB"/>
+              </a:p>
+            </p:txBody>
+          </p:sp>
+        </p:grpSp>
+        <p:sp>
+          <p:nvSpPr>
+            <p:cNvPr id="9" name="TextBox 8"/>
+            <p:cNvSpPr txBox="1"/>
+            <p:nvPr/>
+          </p:nvSpPr>
+          <p:spPr>
+            <a:xfrm>
+              <a:off x="5529824" y="2037868"/>
+              <a:ext cx="1039067" cy="253916"/>
+            </a:xfrm>
+            <a:prstGeom prst="rect">
+              <a:avLst/>
+            </a:prstGeom>
+            <a:noFill/>
+          </p:spPr>
+          <p:txBody>
+            <a:bodyPr wrap="none" rtlCol="0">
+              <a:spAutoFit/>
+            </a:bodyPr>
+            <a:lstStyle/>
+            <a:p>
+              <a:r>
+                <a:rPr lang="en-GB" sz="1050" b="1" dirty="0" smtClean="0"/>
+                <a:t>Forward model</a:t>
+              </a:r>
+              <a:endParaRPr lang="en-GB" sz="1050" b="1" dirty="0"/>
+            </a:p>
+          </p:txBody>
+        </p:sp>
+        <p:cxnSp>
+          <p:nvCxnSpPr>
+            <p:cNvPr id="28" name="Straight Arrow Connector 27"/>
+            <p:cNvCxnSpPr/>
+            <p:nvPr/>
+          </p:nvCxnSpPr>
+          <p:spPr>
+            <a:xfrm flipV="1">
+              <a:off x="4869240" y="3363299"/>
+              <a:ext cx="274587" cy="170464"/>
+            </a:xfrm>
+            <a:prstGeom prst="straightConnector1">
+              <a:avLst/>
+            </a:prstGeom>
+            <a:ln w="38100">
+              <a:solidFill>
+                <a:srgbClr val="8D620B"/>
+              </a:solidFill>
+              <a:tailEnd type="triangle"/>
+            </a:ln>
+          </p:spPr>
+          <p:style>
+            <a:lnRef idx="1">
+              <a:schemeClr val="accent1"/>
+            </a:lnRef>
+            <a:fillRef idx="0">
+              <a:schemeClr val="accent1"/>
+            </a:fillRef>
+            <a:effectRef idx="0">
+              <a:schemeClr val="accent1"/>
+            </a:effectRef>
+            <a:fontRef idx="minor">
+              <a:schemeClr val="tx1"/>
+            </a:fontRef>
+          </p:style>
+        </p:cxnSp>
+        <p:cxnSp>
+          <p:nvCxnSpPr>
+            <p:cNvPr id="29" name="Straight Arrow Connector 28"/>
+            <p:cNvCxnSpPr/>
+            <p:nvPr/>
+          </p:nvCxnSpPr>
+          <p:spPr>
+            <a:xfrm flipH="1">
+              <a:off x="4995145" y="3442613"/>
+              <a:ext cx="301111" cy="199225"/>
+            </a:xfrm>
+            <a:prstGeom prst="straightConnector1">
+              <a:avLst/>
+            </a:prstGeom>
+            <a:ln w="38100">
+              <a:solidFill>
+                <a:srgbClr val="8D620B"/>
+              </a:solidFill>
+              <a:tailEnd type="triangle"/>
+            </a:ln>
+          </p:spPr>
+          <p:style>
+            <a:lnRef idx="1">
+              <a:schemeClr val="accent1"/>
+            </a:lnRef>
+            <a:fillRef idx="0">
+              <a:schemeClr val="accent1"/>
+            </a:fillRef>
+            <a:effectRef idx="0">
+              <a:schemeClr val="accent1"/>
+            </a:effectRef>
+            <a:fontRef idx="minor">
+              <a:schemeClr val="tx1"/>
+            </a:fontRef>
+          </p:style>
+        </p:cxnSp>
+        <p:sp>
+          <p:nvSpPr>
+            <p:cNvPr id="30" name="Oval 29"/>
+            <p:cNvSpPr/>
+            <p:nvPr/>
+          </p:nvSpPr>
+          <p:spPr>
+            <a:xfrm>
+              <a:off x="5144323" y="3131992"/>
+              <a:ext cx="303866" cy="303867"/>
+            </a:xfrm>
+            <a:prstGeom prst="ellipse">
+              <a:avLst/>
+            </a:prstGeom>
+            <a:solidFill>
+              <a:srgbClr val="D1A245"/>
+            </a:solidFill>
+            <a:ln w="28575">
+              <a:solidFill>
+                <a:srgbClr val="8D620B"/>
+              </a:solidFill>
+            </a:ln>
+          </p:spPr>
+          <p:style>
+            <a:lnRef idx="2">
+              <a:schemeClr val="accent1">
+                <a:shade val="50000"/>
+              </a:schemeClr>
+            </a:lnRef>
+            <a:fillRef idx="1">
+              <a:schemeClr val="accent1"/>
+            </a:fillRef>
+            <a:effectRef idx="0">
+              <a:schemeClr val="accent1"/>
+            </a:effectRef>
+            <a:fontRef idx="minor">
+              <a:schemeClr val="lt1"/>
+            </a:fontRef>
+          </p:style>
+          <p:txBody>
+            <a:bodyPr rtlCol="0" anchor="ctr"/>
+            <a:lstStyle/>
+            <a:p>
+              <a:pPr algn="ctr"/>
+              <a:endParaRPr lang="en-GB" sz="1200"/>
+            </a:p>
+          </p:txBody>
+        </p:sp>
+        <p:cxnSp>
+          <p:nvCxnSpPr>
+            <p:cNvPr id="40" name="Straight Arrow Connector 39"/>
+            <p:cNvCxnSpPr/>
+            <p:nvPr/>
+          </p:nvCxnSpPr>
+          <p:spPr>
+            <a:xfrm rot="5400000" flipV="1">
+              <a:off x="4213352" y="3332346"/>
+              <a:ext cx="0" cy="150385"/>
+            </a:xfrm>
+            <a:prstGeom prst="straightConnector1">
+              <a:avLst/>
+            </a:prstGeom>
+            <a:ln w="38100">
+              <a:solidFill>
+                <a:srgbClr val="38528C"/>
+              </a:solidFill>
+              <a:tailEnd type="triangle"/>
+            </a:ln>
+          </p:spPr>
+          <p:style>
+            <a:lnRef idx="1">
+              <a:schemeClr val="accent1"/>
+            </a:lnRef>
+            <a:fillRef idx="0">
+              <a:schemeClr val="accent1"/>
+            </a:fillRef>
+            <a:effectRef idx="0">
+              <a:schemeClr val="accent1"/>
+            </a:effectRef>
+            <a:fontRef idx="minor">
+              <a:schemeClr val="tx1"/>
+            </a:fontRef>
+          </p:style>
+        </p:cxnSp>
+        <p:cxnSp>
+          <p:nvCxnSpPr>
+            <p:cNvPr id="42" name="Straight Arrow Connector 41"/>
+            <p:cNvCxnSpPr/>
+            <p:nvPr/>
+          </p:nvCxnSpPr>
+          <p:spPr>
+            <a:xfrm>
+              <a:off x="4491573" y="3538293"/>
+              <a:ext cx="170912" cy="103545"/>
+            </a:xfrm>
+            <a:prstGeom prst="straightConnector1">
+              <a:avLst/>
+            </a:prstGeom>
+            <a:ln w="38100">
+              <a:solidFill>
+                <a:srgbClr val="8D620B"/>
+              </a:solidFill>
+              <a:tailEnd type="triangle"/>
+            </a:ln>
+          </p:spPr>
+          <p:style>
+            <a:lnRef idx="1">
+              <a:schemeClr val="accent1"/>
+            </a:lnRef>
+            <a:fillRef idx="0">
+              <a:schemeClr val="accent1"/>
+            </a:fillRef>
+            <a:effectRef idx="0">
+              <a:schemeClr val="accent1"/>
+            </a:effectRef>
+            <a:fontRef idx="minor">
+              <a:schemeClr val="tx1"/>
+            </a:fontRef>
+          </p:style>
+        </p:cxnSp>
+        <p:sp>
+          <p:nvSpPr>
+            <p:cNvPr id="36" name="Oval 35"/>
+            <p:cNvSpPr/>
+            <p:nvPr/>
+          </p:nvSpPr>
+          <p:spPr>
+            <a:xfrm>
+              <a:off x="4307986" y="3257615"/>
+              <a:ext cx="303866" cy="303867"/>
+            </a:xfrm>
+            <a:prstGeom prst="ellipse">
+              <a:avLst/>
+            </a:prstGeom>
+            <a:solidFill>
+              <a:srgbClr val="D1A245"/>
+            </a:solidFill>
+            <a:ln w="28575">
+              <a:solidFill>
+                <a:srgbClr val="8D620B"/>
+              </a:solidFill>
+            </a:ln>
+          </p:spPr>
+          <p:style>
+            <a:lnRef idx="2">
+              <a:schemeClr val="accent1">
+                <a:shade val="50000"/>
+              </a:schemeClr>
+            </a:lnRef>
+            <a:fillRef idx="1">
+              <a:schemeClr val="accent1"/>
+            </a:fillRef>
+            <a:effectRef idx="0">
+              <a:schemeClr val="accent1"/>
+            </a:effectRef>
+            <a:fontRef idx="minor">
+              <a:schemeClr val="lt1"/>
+            </a:fontRef>
+          </p:style>
+          <p:txBody>
+            <a:bodyPr rtlCol="0" anchor="ctr"/>
+            <a:lstStyle/>
+            <a:p>
+              <a:pPr algn="ctr"/>
+              <a:endParaRPr lang="en-GB" sz="1200"/>
+            </a:p>
+          </p:txBody>
+        </p:sp>
+        <p:cxnSp>
+          <p:nvCxnSpPr>
+            <p:cNvPr id="46" name="Straight Arrow Connector 45"/>
+            <p:cNvCxnSpPr/>
+            <p:nvPr/>
+          </p:nvCxnSpPr>
+          <p:spPr>
+            <a:xfrm flipH="1" flipV="1">
+              <a:off x="4631293" y="3444870"/>
+              <a:ext cx="145842" cy="79819"/>
+            </a:xfrm>
+            <a:prstGeom prst="straightConnector1">
+              <a:avLst/>
+            </a:prstGeom>
+            <a:ln w="38100">
+              <a:solidFill>
+                <a:srgbClr val="8D620B"/>
+              </a:solidFill>
+              <a:tailEnd type="triangle"/>
+            </a:ln>
+          </p:spPr>
+          <p:style>
+            <a:lnRef idx="1">
+              <a:schemeClr val="accent1"/>
+            </a:lnRef>
+            <a:fillRef idx="0">
+              <a:schemeClr val="accent1"/>
+            </a:fillRef>
+            <a:effectRef idx="0">
+              <a:schemeClr val="accent1"/>
+            </a:effectRef>
+            <a:fontRef idx="minor">
+              <a:schemeClr val="tx1"/>
+            </a:fontRef>
+          </p:style>
+        </p:cxnSp>
+        <p:sp>
+          <p:nvSpPr>
+            <p:cNvPr id="31" name="Oval 30"/>
+            <p:cNvSpPr/>
+            <p:nvPr/>
+          </p:nvSpPr>
+          <p:spPr>
+            <a:xfrm>
+              <a:off x="4678496" y="3499890"/>
+              <a:ext cx="303866" cy="303867"/>
+            </a:xfrm>
+            <a:prstGeom prst="ellipse">
+              <a:avLst/>
+            </a:prstGeom>
+            <a:solidFill>
+              <a:srgbClr val="D1A245"/>
+            </a:solidFill>
+            <a:ln w="28575">
+              <a:solidFill>
+                <a:srgbClr val="8D620B"/>
+              </a:solidFill>
+            </a:ln>
+          </p:spPr>
+          <p:style>
+            <a:lnRef idx="2">
+              <a:schemeClr val="accent1">
+                <a:shade val="50000"/>
+              </a:schemeClr>
+            </a:lnRef>
+            <a:fillRef idx="1">
+              <a:schemeClr val="accent1"/>
+            </a:fillRef>
+            <a:effectRef idx="0">
+              <a:schemeClr val="accent1"/>
+            </a:effectRef>
+            <a:fontRef idx="minor">
+              <a:schemeClr val="lt1"/>
+            </a:fontRef>
+          </p:style>
+          <p:txBody>
+            <a:bodyPr rtlCol="0" anchor="ctr"/>
+            <a:lstStyle/>
+            <a:p>
+              <a:pPr algn="ctr"/>
+              <a:endParaRPr lang="en-GB" sz="1200"/>
+            </a:p>
+          </p:txBody>
+        </p:sp>
+        <p:sp>
+          <p:nvSpPr>
+            <p:cNvPr id="52" name="TextBox 51"/>
+            <p:cNvSpPr txBox="1"/>
+            <p:nvPr/>
+          </p:nvSpPr>
+          <p:spPr>
+            <a:xfrm>
+              <a:off x="5457606" y="4029594"/>
+              <a:ext cx="1098378" cy="253916"/>
+            </a:xfrm>
+            <a:prstGeom prst="rect">
+              <a:avLst/>
+            </a:prstGeom>
+            <a:noFill/>
+          </p:spPr>
+          <p:txBody>
+            <a:bodyPr wrap="none" rtlCol="0">
+              <a:spAutoFit/>
+            </a:bodyPr>
+            <a:lstStyle/>
+            <a:p>
+              <a:r>
+                <a:rPr lang="en-GB" sz="1050" b="1" dirty="0" smtClean="0"/>
+                <a:t>Inverse problem</a:t>
+              </a:r>
+              <a:endParaRPr lang="en-GB" sz="1050" b="1" dirty="0"/>
+            </a:p>
+          </p:txBody>
+        </p:sp>
+        <p:sp>
+          <p:nvSpPr>
+            <p:cNvPr id="54" name="Arc 53"/>
+            <p:cNvSpPr/>
+            <p:nvPr/>
+          </p:nvSpPr>
+          <p:spPr>
+            <a:xfrm flipH="1" flipV="1">
+              <a:off x="4866603" y="3731410"/>
+              <a:ext cx="2315292" cy="355140"/>
+            </a:xfrm>
+            <a:prstGeom prst="arc">
+              <a:avLst>
+                <a:gd name="adj1" fmla="val 10982413"/>
+                <a:gd name="adj2" fmla="val 21432134"/>
+              </a:avLst>
+            </a:prstGeom>
+            <a:ln w="12700">
+              <a:solidFill>
+                <a:schemeClr val="tx1"/>
+              </a:solidFill>
+              <a:headEnd type="none" w="med" len="med"/>
+              <a:tailEnd type="arrow" w="med" len="med"/>
+            </a:ln>
+          </p:spPr>
+          <p:style>
+            <a:lnRef idx="1">
+              <a:schemeClr val="accent1"/>
+            </a:lnRef>
+            <a:fillRef idx="0">
+              <a:schemeClr val="accent1"/>
+            </a:fillRef>
+            <a:effectRef idx="0">
+              <a:schemeClr val="accent1"/>
+            </a:effectRef>
+            <a:fontRef idx="minor">
+              <a:schemeClr val="tx1"/>
+            </a:fontRef>
+          </p:style>
+          <p:txBody>
+            <a:bodyPr rtlCol="0" anchor="ctr"/>
+            <a:lstStyle/>
+            <a:p>
+              <a:pPr algn="ctr"/>
+              <a:endParaRPr lang="en-GB"/>
+            </a:p>
+          </p:txBody>
+        </p:sp>
+        <p:sp>
+          <p:nvSpPr>
+            <p:cNvPr id="56" name="Arc 55"/>
+            <p:cNvSpPr/>
+            <p:nvPr/>
+          </p:nvSpPr>
+          <p:spPr>
+            <a:xfrm>
+              <a:off x="4866603" y="2732849"/>
+              <a:ext cx="2315292" cy="355140"/>
+            </a:xfrm>
+            <a:prstGeom prst="arc">
+              <a:avLst>
+                <a:gd name="adj1" fmla="val 10982413"/>
+                <a:gd name="adj2" fmla="val 21432134"/>
+              </a:avLst>
+            </a:prstGeom>
+            <a:ln w="12700">
+              <a:solidFill>
+                <a:schemeClr val="tx1"/>
+              </a:solidFill>
+              <a:headEnd type="none" w="med" len="med"/>
+              <a:tailEnd type="arrow" w="med" len="med"/>
+            </a:ln>
+          </p:spPr>
+          <p:style>
+            <a:lnRef idx="1">
+              <a:schemeClr val="accent1"/>
+            </a:lnRef>
+            <a:fillRef idx="0">
+              <a:schemeClr val="accent1"/>
+            </a:fillRef>
+            <a:effectRef idx="0">
+              <a:schemeClr val="accent1"/>
+            </a:effectRef>
+            <a:fontRef idx="minor">
+              <a:schemeClr val="tx1"/>
+            </a:fontRef>
+          </p:style>
+          <p:txBody>
+            <a:bodyPr rtlCol="0" anchor="ctr"/>
+            <a:lstStyle/>
+            <a:p>
+              <a:pPr algn="ctr"/>
+              <a:endParaRPr lang="en-GB"/>
+            </a:p>
+          </p:txBody>
+        </p:sp>
       </p:grpSp>
     </p:spTree>
     <p:extLst>

</xml_diff>